<commit_message>
Add agenda lab synchronisation tests
</commit_message>
<xml_diff>
--- a/doc/test/AgendaSlidesTextAfterSync.pptx
+++ b/doc/test/AgendaSlidesTextAfterSync.pptx
@@ -194,7 +194,7 @@
       </p14:sectionLst>
     </p:ext>
     <p:ext uri="{EFAFB233-063F-42B5-8137-9DF3F51BA10A}">
-      <p15:sldGuideLst xmlns="" xmlns:p15="http://schemas.microsoft.com/office/powerpoint/2012/main">
+      <p15:sldGuideLst xmlns:p15="http://schemas.microsoft.com/office/powerpoint/2012/main" xmlns="">
         <p15:guide id="1" orient="horz" pos="2160">
           <p15:clr>
             <a:srgbClr val="A4A3A4"/>
@@ -607,7 +607,7 @@
           <a:p>
             <a:r>
               <a:rPr lang="en-US" smtClean="0"/>
-              <a:t>This notes page is used to store data - Do not edit the notes. T2JqZWN0cyB3aXRoIHNhbWUgbmFtZQ==@VW5uYW1lZCBTaGFwZSAyMDE1MDYxOTE2NDc1NTY2ODcy@VW5uYW1lZCBTaGFwZSAyMDE1MDYxOTE2NDc1NTY2ODcz@UFBUVGVtcGxhdGVNYXJrZXI=@UHB0TGFic0FnZW5kYV8mXkBDb250ZW50U2hhcGVfJl5AMjAxNTA2MTkxNjI4Mzg3Nzg1MA==@VW5uYW1lZCBTaGFwZSAyMDE1MDYxOTE2NDc1NTY2Njcw@VW5uYW1lZCBTaGFwZSAyMDE1MDYxOTE2NDc1NTY2Nzcx@-805424442</a:t>
+              <a:t>This notes page is used to store data - Do not edit the notes. T2JqZWN0cyB3aXRoIHNhbWUgbmFtZQ==@VW5uYW1lZCBTaGFwZSAyMDE1MDYxOTE4NTgzOTA3MTIy@VW5uYW1lZCBTaGFwZSAyMDE1MDYxOTE4NTgzOTA3MTIz@UFBUVGVtcGxhdGVNYXJrZXI=@UHB0TGFic0FnZW5kYV8mXkBDb250ZW50U2hhcGVfJl5AMjAxNTA2MTkxNjI4Mzg3Nzg1MA==@VW5uYW1lZCBTaGFwZSAyMDE1MDYxOTE4NTgzOTA1NTYw@VW5uYW1lZCBTaGFwZSAyMDE1MDYxOTE4NTgzOTA1NTYx@-1841862451</a:t>
             </a:r>
             <a:endParaRPr lang="en-US"/>
           </a:p>
@@ -10233,7 +10233,7 @@
       </p:sp>
       <p:sp>
         <p:nvSpPr>
-          <p:cNvPr id="11" name="Unnamed Shape 2015061916475566872"/>
+          <p:cNvPr id="11" name="Unnamed Shape 2015061918583907122"/>
           <p:cNvSpPr/>
           <p:nvPr/>
         </p:nvSpPr>
@@ -10276,7 +10276,7 @@
       </p:sp>
       <p:sp>
         <p:nvSpPr>
-          <p:cNvPr id="12" name="Unnamed Shape 2015061916475566873"/>
+          <p:cNvPr id="12" name="Unnamed Shape 2015061918583907123"/>
           <p:cNvSpPr/>
           <p:nvPr/>
         </p:nvSpPr>
@@ -10488,7 +10488,7 @@
       </p:sp>
       <p:sp>
         <p:nvSpPr>
-          <p:cNvPr id="13" name="Unnamed Shape 2015061916475566670"/>
+          <p:cNvPr id="13" name="Unnamed Shape 2015061918583905560"/>
           <p:cNvSpPr/>
           <p:nvPr/>
         </p:nvSpPr>
@@ -10531,7 +10531,7 @@
       </p:sp>
       <p:sp>
         <p:nvSpPr>
-          <p:cNvPr id="14" name="Unnamed Shape 2015061916475566771"/>
+          <p:cNvPr id="14" name="Unnamed Shape 2015061918583905561"/>
           <p:cNvSpPr txBox="1"/>
           <p:nvPr/>
         </p:nvSpPr>
@@ -10958,7 +10958,7 @@
       </p:sp>
       <p:sp>
         <p:nvSpPr>
-          <p:cNvPr id="8" name="Unnamed Shape 2015061916475566872"/>
+          <p:cNvPr id="8" name="Unnamed Shape 2015061918583907122"/>
           <p:cNvSpPr>
             <a:spLocks/>
           </p:cNvSpPr>
@@ -11003,7 +11003,7 @@
       </p:sp>
       <p:sp>
         <p:nvSpPr>
-          <p:cNvPr id="9" name="Unnamed Shape 2015061916475566873"/>
+          <p:cNvPr id="9" name="Unnamed Shape 2015061918583907123"/>
           <p:cNvSpPr>
             <a:spLocks/>
           </p:cNvSpPr>
@@ -11248,7 +11248,7 @@
       </p:sp>
       <p:sp>
         <p:nvSpPr>
-          <p:cNvPr id="10" name="Unnamed Shape 2015061916475566670"/>
+          <p:cNvPr id="10" name="Unnamed Shape 2015061918583905560"/>
           <p:cNvSpPr>
             <a:spLocks/>
           </p:cNvSpPr>
@@ -11293,7 +11293,7 @@
       </p:sp>
       <p:sp>
         <p:nvSpPr>
-          <p:cNvPr id="11" name="Unnamed Shape 2015061916475566771"/>
+          <p:cNvPr id="11" name="Unnamed Shape 2015061918583905561"/>
           <p:cNvSpPr txBox="1">
             <a:spLocks/>
           </p:cNvSpPr>
@@ -11737,7 +11737,7 @@
       </p:sp>
       <p:sp>
         <p:nvSpPr>
-          <p:cNvPr id="8" name="Unnamed Shape 2015061916475566872"/>
+          <p:cNvPr id="8" name="Unnamed Shape 2015061918583907122"/>
           <p:cNvSpPr>
             <a:spLocks/>
           </p:cNvSpPr>
@@ -11782,7 +11782,7 @@
       </p:sp>
       <p:sp>
         <p:nvSpPr>
-          <p:cNvPr id="9" name="Unnamed Shape 2015061916475566873"/>
+          <p:cNvPr id="9" name="Unnamed Shape 2015061918583907123"/>
           <p:cNvSpPr>
             <a:spLocks/>
           </p:cNvSpPr>
@@ -12019,7 +12019,7 @@
       </p:sp>
       <p:sp>
         <p:nvSpPr>
-          <p:cNvPr id="10" name="Unnamed Shape 2015061916475566670"/>
+          <p:cNvPr id="10" name="Unnamed Shape 2015061918583905560"/>
           <p:cNvSpPr>
             <a:spLocks/>
           </p:cNvSpPr>
@@ -12064,7 +12064,7 @@
       </p:sp>
       <p:sp>
         <p:nvSpPr>
-          <p:cNvPr id="11" name="Unnamed Shape 2015061916475566771"/>
+          <p:cNvPr id="11" name="Unnamed Shape 2015061918583905561"/>
           <p:cNvSpPr txBox="1">
             <a:spLocks/>
           </p:cNvSpPr>
@@ -12935,7 +12935,7 @@
       </p:sp>
       <p:sp>
         <p:nvSpPr>
-          <p:cNvPr id="8" name="Unnamed Shape 2015061916475566872"/>
+          <p:cNvPr id="8" name="Unnamed Shape 2015061918583907122"/>
           <p:cNvSpPr>
             <a:spLocks/>
           </p:cNvSpPr>
@@ -12980,7 +12980,7 @@
       </p:sp>
       <p:sp>
         <p:nvSpPr>
-          <p:cNvPr id="9" name="Unnamed Shape 2015061916475566873"/>
+          <p:cNvPr id="9" name="Unnamed Shape 2015061918583907123"/>
           <p:cNvSpPr>
             <a:spLocks/>
           </p:cNvSpPr>
@@ -13217,7 +13217,7 @@
       </p:sp>
       <p:sp>
         <p:nvSpPr>
-          <p:cNvPr id="10" name="Unnamed Shape 2015061916475566670"/>
+          <p:cNvPr id="10" name="Unnamed Shape 2015061918583905560"/>
           <p:cNvSpPr>
             <a:spLocks/>
           </p:cNvSpPr>
@@ -13262,7 +13262,7 @@
       </p:sp>
       <p:sp>
         <p:nvSpPr>
-          <p:cNvPr id="11" name="Unnamed Shape 2015061916475566771"/>
+          <p:cNvPr id="11" name="Unnamed Shape 2015061918583905561"/>
           <p:cNvSpPr txBox="1">
             <a:spLocks/>
           </p:cNvSpPr>
@@ -13631,7 +13631,7 @@
       </p:grpSpPr>
       <p:pic>
         <p:nvPicPr>
-          <p:cNvPr id="2" name="PPTIndicator201506191647573608"/>
+          <p:cNvPr id="2" name="PPTIndicator201506191858409276"/>
           <p:cNvPicPr>
             <a:picLocks/>
           </p:cNvPicPr>
@@ -13706,7 +13706,7 @@
       </p:sp>
       <p:sp>
         <p:nvSpPr>
-          <p:cNvPr id="6" name="Unnamed Shape 2015061916475566872"/>
+          <p:cNvPr id="6" name="Unnamed Shape 2015061918583907122"/>
           <p:cNvSpPr>
             <a:spLocks/>
           </p:cNvSpPr>
@@ -13751,7 +13751,7 @@
       </p:sp>
       <p:sp>
         <p:nvSpPr>
-          <p:cNvPr id="7" name="Unnamed Shape 2015061916475566873"/>
+          <p:cNvPr id="7" name="Unnamed Shape 2015061918583907123"/>
           <p:cNvSpPr>
             <a:spLocks/>
           </p:cNvSpPr>
@@ -13980,7 +13980,7 @@
       </p:sp>
       <p:sp>
         <p:nvSpPr>
-          <p:cNvPr id="9" name="Unnamed Shape 2015061916475566670"/>
+          <p:cNvPr id="9" name="Unnamed Shape 2015061918583905560"/>
           <p:cNvSpPr>
             <a:spLocks/>
           </p:cNvSpPr>
@@ -14025,7 +14025,7 @@
       </p:sp>
       <p:sp>
         <p:nvSpPr>
-          <p:cNvPr id="10" name="Unnamed Shape 2015061916475566771"/>
+          <p:cNvPr id="10" name="Unnamed Shape 2015061918583905561"/>
           <p:cNvSpPr txBox="1">
             <a:spLocks/>
           </p:cNvSpPr>
@@ -14248,7 +14248,7 @@
     </p:spTree>
     <p:extLst>
       <p:ext uri="{BB962C8B-B14F-4D97-AF65-F5344CB8AC3E}">
-        <p14:creationId xmlns:p14="http://schemas.microsoft.com/office/powerpoint/2010/main" val="705234651"/>
+        <p14:creationId xmlns:p14="http://schemas.microsoft.com/office/powerpoint/2010/main" val="3285958563"/>
       </p:ext>
     </p:extLst>
   </p:cSld>
@@ -14756,7 +14756,7 @@
       </p:sp>
       <p:sp>
         <p:nvSpPr>
-          <p:cNvPr id="8" name="Unnamed Shape 2015061916475566872"/>
+          <p:cNvPr id="8" name="Unnamed Shape 2015061918583907122"/>
           <p:cNvSpPr>
             <a:spLocks/>
           </p:cNvSpPr>
@@ -14801,7 +14801,7 @@
       </p:sp>
       <p:sp>
         <p:nvSpPr>
-          <p:cNvPr id="9" name="Unnamed Shape 2015061916475566873"/>
+          <p:cNvPr id="9" name="Unnamed Shape 2015061918583907123"/>
           <p:cNvSpPr>
             <a:spLocks/>
           </p:cNvSpPr>
@@ -15030,7 +15030,7 @@
       </p:sp>
       <p:sp>
         <p:nvSpPr>
-          <p:cNvPr id="10" name="Unnamed Shape 2015061916475566670"/>
+          <p:cNvPr id="10" name="Unnamed Shape 2015061918583905560"/>
           <p:cNvSpPr>
             <a:spLocks/>
           </p:cNvSpPr>
@@ -15075,7 +15075,7 @@
       </p:sp>
       <p:sp>
         <p:nvSpPr>
-          <p:cNvPr id="11" name="Unnamed Shape 2015061916475566771"/>
+          <p:cNvPr id="11" name="Unnamed Shape 2015061918583905561"/>
           <p:cNvSpPr txBox="1">
             <a:spLocks/>
           </p:cNvSpPr>
@@ -15519,7 +15519,7 @@
       </p:sp>
       <p:sp>
         <p:nvSpPr>
-          <p:cNvPr id="8" name="Unnamed Shape 2015061916475566872"/>
+          <p:cNvPr id="8" name="Unnamed Shape 2015061918583907122"/>
           <p:cNvSpPr>
             <a:spLocks/>
           </p:cNvSpPr>
@@ -15564,7 +15564,7 @@
       </p:sp>
       <p:sp>
         <p:nvSpPr>
-          <p:cNvPr id="9" name="Unnamed Shape 2015061916475566873"/>
+          <p:cNvPr id="9" name="Unnamed Shape 2015061918583907123"/>
           <p:cNvSpPr>
             <a:spLocks/>
           </p:cNvSpPr>
@@ -15789,7 +15789,7 @@
       </p:sp>
       <p:sp>
         <p:nvSpPr>
-          <p:cNvPr id="10" name="Unnamed Shape 2015061916475566670"/>
+          <p:cNvPr id="10" name="Unnamed Shape 2015061918583905560"/>
           <p:cNvSpPr>
             <a:spLocks/>
           </p:cNvSpPr>
@@ -15834,7 +15834,7 @@
       </p:sp>
       <p:sp>
         <p:nvSpPr>
-          <p:cNvPr id="11" name="Unnamed Shape 2015061916475566771"/>
+          <p:cNvPr id="11" name="Unnamed Shape 2015061918583905561"/>
           <p:cNvSpPr txBox="1">
             <a:spLocks/>
           </p:cNvSpPr>
@@ -16323,7 +16323,7 @@
       </p:sp>
       <p:sp>
         <p:nvSpPr>
-          <p:cNvPr id="8" name="Unnamed Shape 2015061916475566872"/>
+          <p:cNvPr id="8" name="Unnamed Shape 2015061918583907122"/>
           <p:cNvSpPr>
             <a:spLocks/>
           </p:cNvSpPr>
@@ -16368,7 +16368,7 @@
       </p:sp>
       <p:sp>
         <p:nvSpPr>
-          <p:cNvPr id="9" name="Unnamed Shape 2015061916475566873"/>
+          <p:cNvPr id="9" name="Unnamed Shape 2015061918583907123"/>
           <p:cNvSpPr>
             <a:spLocks/>
           </p:cNvSpPr>
@@ -16593,7 +16593,7 @@
       </p:sp>
       <p:sp>
         <p:nvSpPr>
-          <p:cNvPr id="10" name="Unnamed Shape 2015061916475566670"/>
+          <p:cNvPr id="10" name="Unnamed Shape 2015061918583905560"/>
           <p:cNvSpPr>
             <a:spLocks/>
           </p:cNvSpPr>
@@ -16638,7 +16638,7 @@
       </p:sp>
       <p:sp>
         <p:nvSpPr>
-          <p:cNvPr id="11" name="Unnamed Shape 2015061916475566771"/>
+          <p:cNvPr id="11" name="Unnamed Shape 2015061918583905561"/>
           <p:cNvSpPr txBox="1">
             <a:spLocks/>
           </p:cNvSpPr>
@@ -17038,7 +17038,7 @@
     </p:spTree>
     <p:extLst>
       <p:ext uri="{BB962C8B-B14F-4D97-AF65-F5344CB8AC3E}">
-        <p14:creationId xmlns:p14="http://schemas.microsoft.com/office/powerpoint/2010/main" val="2726673739"/>
+        <p14:creationId xmlns:p14="http://schemas.microsoft.com/office/powerpoint/2010/main" val="863350807"/>
       </p:ext>
     </p:extLst>
   </p:cSld>
@@ -17150,7 +17150,7 @@
       </p:sp>
       <p:sp>
         <p:nvSpPr>
-          <p:cNvPr id="8" name="Unnamed Shape 2015061916475566872"/>
+          <p:cNvPr id="8" name="Unnamed Shape 2015061918583907122"/>
           <p:cNvSpPr>
             <a:spLocks/>
           </p:cNvSpPr>
@@ -17195,7 +17195,7 @@
       </p:sp>
       <p:sp>
         <p:nvSpPr>
-          <p:cNvPr id="9" name="Unnamed Shape 2015061916475566873"/>
+          <p:cNvPr id="9" name="Unnamed Shape 2015061918583907123"/>
           <p:cNvSpPr>
             <a:spLocks/>
           </p:cNvSpPr>
@@ -17456,7 +17456,7 @@
       </p:sp>
       <p:sp>
         <p:nvSpPr>
-          <p:cNvPr id="10" name="Unnamed Shape 2015061916475566670"/>
+          <p:cNvPr id="10" name="Unnamed Shape 2015061918583905560"/>
           <p:cNvSpPr>
             <a:spLocks/>
           </p:cNvSpPr>
@@ -17501,7 +17501,7 @@
       </p:sp>
       <p:sp>
         <p:nvSpPr>
-          <p:cNvPr id="11" name="Unnamed Shape 2015061916475566771"/>
+          <p:cNvPr id="11" name="Unnamed Shape 2015061918583905561"/>
           <p:cNvSpPr txBox="1">
             <a:spLocks/>
           </p:cNvSpPr>
@@ -18078,7 +18078,7 @@
       </p:sp>
       <p:sp>
         <p:nvSpPr>
-          <p:cNvPr id="9" name="Unnamed Shape 2015061916475566872"/>
+          <p:cNvPr id="9" name="Unnamed Shape 2015061918583907122"/>
           <p:cNvSpPr>
             <a:spLocks/>
           </p:cNvSpPr>
@@ -18123,7 +18123,7 @@
       </p:sp>
       <p:sp>
         <p:nvSpPr>
-          <p:cNvPr id="10" name="Unnamed Shape 2015061916475566873"/>
+          <p:cNvPr id="10" name="Unnamed Shape 2015061918583907123"/>
           <p:cNvSpPr>
             <a:spLocks/>
           </p:cNvSpPr>
@@ -18424,7 +18424,7 @@
       </p:sp>
       <p:sp>
         <p:nvSpPr>
-          <p:cNvPr id="11" name="Unnamed Shape 2015061916475566670"/>
+          <p:cNvPr id="11" name="Unnamed Shape 2015061918583905560"/>
           <p:cNvSpPr>
             <a:spLocks/>
           </p:cNvSpPr>
@@ -18469,7 +18469,7 @@
       </p:sp>
       <p:sp>
         <p:nvSpPr>
-          <p:cNvPr id="12" name="Unnamed Shape 2015061916475566771"/>
+          <p:cNvPr id="12" name="Unnamed Shape 2015061918583905561"/>
           <p:cNvSpPr txBox="1">
             <a:spLocks/>
           </p:cNvSpPr>
@@ -18913,7 +18913,7 @@
       </p:sp>
       <p:sp>
         <p:nvSpPr>
-          <p:cNvPr id="9" name="Unnamed Shape 2015061916475566872"/>
+          <p:cNvPr id="9" name="Unnamed Shape 2015061918583907122"/>
           <p:cNvSpPr>
             <a:spLocks/>
           </p:cNvSpPr>
@@ -18958,7 +18958,7 @@
       </p:sp>
       <p:sp>
         <p:nvSpPr>
-          <p:cNvPr id="10" name="Unnamed Shape 2015061916475566873"/>
+          <p:cNvPr id="10" name="Unnamed Shape 2015061918583907123"/>
           <p:cNvSpPr>
             <a:spLocks/>
           </p:cNvSpPr>
@@ -19251,7 +19251,7 @@
       </p:sp>
       <p:sp>
         <p:nvSpPr>
-          <p:cNvPr id="11" name="Unnamed Shape 2015061916475566670"/>
+          <p:cNvPr id="11" name="Unnamed Shape 2015061918583905560"/>
           <p:cNvSpPr>
             <a:spLocks/>
           </p:cNvSpPr>
@@ -19296,7 +19296,7 @@
       </p:sp>
       <p:sp>
         <p:nvSpPr>
-          <p:cNvPr id="12" name="Unnamed Shape 2015061916475566771"/>
+          <p:cNvPr id="12" name="Unnamed Shape 2015061918583905561"/>
           <p:cNvSpPr txBox="1">
             <a:spLocks/>
           </p:cNvSpPr>
@@ -19762,7 +19762,7 @@
       </p:grpSpPr>
       <p:pic>
         <p:nvPicPr>
-          <p:cNvPr id="2" name="PPTIndicator201506191647561247"/>
+          <p:cNvPr id="2" name="PPTIndicator201506191858395704"/>
           <p:cNvPicPr>
             <a:picLocks/>
           </p:cNvPicPr>
@@ -19837,7 +19837,7 @@
       </p:sp>
       <p:sp>
         <p:nvSpPr>
-          <p:cNvPr id="6" name="Unnamed Shape 2015061916475566872"/>
+          <p:cNvPr id="6" name="Unnamed Shape 2015061918583907122"/>
           <p:cNvSpPr>
             <a:spLocks/>
           </p:cNvSpPr>
@@ -19882,7 +19882,7 @@
       </p:sp>
       <p:sp>
         <p:nvSpPr>
-          <p:cNvPr id="7" name="Unnamed Shape 2015061916475566873"/>
+          <p:cNvPr id="7" name="Unnamed Shape 2015061918583907123"/>
           <p:cNvSpPr>
             <a:spLocks/>
           </p:cNvSpPr>
@@ -20135,7 +20135,7 @@
       </p:sp>
       <p:sp>
         <p:nvSpPr>
-          <p:cNvPr id="9" name="Unnamed Shape 2015061916475566670"/>
+          <p:cNvPr id="9" name="Unnamed Shape 2015061918583905560"/>
           <p:cNvSpPr>
             <a:spLocks/>
           </p:cNvSpPr>
@@ -20180,7 +20180,7 @@
       </p:sp>
       <p:sp>
         <p:nvSpPr>
-          <p:cNvPr id="10" name="Unnamed Shape 2015061916475566771"/>
+          <p:cNvPr id="10" name="Unnamed Shape 2015061918583905561"/>
           <p:cNvSpPr txBox="1">
             <a:spLocks/>
           </p:cNvSpPr>
@@ -20403,7 +20403,7 @@
     </p:spTree>
     <p:extLst>
       <p:ext uri="{BB962C8B-B14F-4D97-AF65-F5344CB8AC3E}">
-        <p14:creationId xmlns:p14="http://schemas.microsoft.com/office/powerpoint/2010/main" val="4078151823"/>
+        <p14:creationId xmlns:p14="http://schemas.microsoft.com/office/powerpoint/2010/main" val="4286599415"/>
       </p:ext>
     </p:extLst>
   </p:cSld>
@@ -20549,7 +20549,7 @@
       </p:grpSpPr>
       <p:pic>
         <p:nvPicPr>
-          <p:cNvPr id="2" name="PPTIndicator201506191647565328"/>
+          <p:cNvPr id="2" name="PPTIndicator201506191858400228"/>
           <p:cNvPicPr>
             <a:picLocks/>
           </p:cNvPicPr>
@@ -20624,7 +20624,7 @@
       </p:sp>
       <p:sp>
         <p:nvSpPr>
-          <p:cNvPr id="6" name="Unnamed Shape 2015061916475566872"/>
+          <p:cNvPr id="6" name="Unnamed Shape 2015061918583907122"/>
           <p:cNvSpPr>
             <a:spLocks/>
           </p:cNvSpPr>
@@ -20669,7 +20669,7 @@
       </p:sp>
       <p:sp>
         <p:nvSpPr>
-          <p:cNvPr id="7" name="Unnamed Shape 2015061916475566873"/>
+          <p:cNvPr id="7" name="Unnamed Shape 2015061918583907123"/>
           <p:cNvSpPr>
             <a:spLocks/>
           </p:cNvSpPr>
@@ -20914,7 +20914,7 @@
       </p:sp>
       <p:sp>
         <p:nvSpPr>
-          <p:cNvPr id="9" name="Unnamed Shape 2015061916475566670"/>
+          <p:cNvPr id="9" name="Unnamed Shape 2015061918583905560"/>
           <p:cNvSpPr>
             <a:spLocks/>
           </p:cNvSpPr>
@@ -20959,7 +20959,7 @@
       </p:sp>
       <p:sp>
         <p:nvSpPr>
-          <p:cNvPr id="10" name="Unnamed Shape 2015061916475566771"/>
+          <p:cNvPr id="10" name="Unnamed Shape 2015061918583905561"/>
           <p:cNvSpPr txBox="1">
             <a:spLocks/>
           </p:cNvSpPr>
@@ -21182,7 +21182,7 @@
     </p:spTree>
     <p:extLst>
       <p:ext uri="{BB962C8B-B14F-4D97-AF65-F5344CB8AC3E}">
-        <p14:creationId xmlns:p14="http://schemas.microsoft.com/office/powerpoint/2010/main" val="2551540264"/>
+        <p14:creationId xmlns:p14="http://schemas.microsoft.com/office/powerpoint/2010/main" val="296892583"/>
       </p:ext>
     </p:extLst>
   </p:cSld>

</xml_diff>